<commit_message>
week2 2018 auturbo uploaded
</commit_message>
<xml_diff>
--- a/auturbo_2018_spring/auturbo_2018_spring_week1.pptx
+++ b/auturbo_2018_spring/auturbo_2018_spring_week1.pptx
@@ -4892,11 +4892,7 @@
               <a:pPr algn="ctr"/>
               <a:r>
                 <a:rPr lang="ko-KR" altLang="en-US" sz="1600" dirty="0" smtClean="0"/>
-                <a:t>차량 </a:t>
-              </a:r>
-              <a:r>
-                <a:rPr lang="ko-KR" altLang="en-US" sz="1600" dirty="0" smtClean="0"/>
-                <a:t>로봇</a:t>
+                <a:t>차량 로봇</a:t>
               </a:r>
               <a:endParaRPr lang="ko-KR" altLang="en-US" sz="1600" dirty="0"/>
             </a:p>
@@ -4935,11 +4931,7 @@
               <a:pPr algn="ctr"/>
               <a:r>
                 <a:rPr lang="ko-KR" altLang="en-US" sz="1600" dirty="0" smtClean="0"/>
-                <a:t>차량 </a:t>
-              </a:r>
-              <a:r>
-                <a:rPr lang="ko-KR" altLang="en-US" sz="1600" dirty="0" smtClean="0"/>
-                <a:t>로봇</a:t>
+                <a:t>차량 로봇</a:t>
               </a:r>
               <a:endParaRPr lang="ko-KR" altLang="en-US" sz="1600" dirty="0"/>
             </a:p>
@@ -4978,11 +4970,7 @@
               <a:pPr algn="ctr"/>
               <a:r>
                 <a:rPr lang="ko-KR" altLang="en-US" sz="1600" dirty="0" smtClean="0"/>
-                <a:t>산업 </a:t>
-              </a:r>
-              <a:r>
-                <a:rPr lang="ko-KR" altLang="en-US" sz="1600" dirty="0" smtClean="0"/>
-                <a:t>로봇</a:t>
+                <a:t>산업 로봇</a:t>
               </a:r>
               <a:endParaRPr lang="ko-KR" altLang="en-US" sz="1600" dirty="0"/>
             </a:p>
@@ -5604,15 +5592,7 @@
             </a:r>
             <a:r>
               <a:rPr lang="en-US" altLang="ko-KR" sz="2400" dirty="0" smtClean="0"/>
-              <a:t> </a:t>
-            </a:r>
-            <a:r>
-              <a:rPr lang="en-US" altLang="ko-KR" sz="2400" dirty="0" smtClean="0"/>
-              <a:t>(</a:t>
-            </a:r>
-            <a:r>
-              <a:rPr lang="en-US" altLang="ko-KR" sz="2400" dirty="0" smtClean="0"/>
-              <a:t>ROS</a:t>
+              <a:t> (ROS</a:t>
             </a:r>
             <a:r>
               <a:rPr lang="ko-KR" altLang="en-US" sz="2400" dirty="0" smtClean="0"/>
@@ -5626,7 +5606,6 @@
               <a:rPr lang="en-US" altLang="ko-KR" sz="2400" dirty="0" smtClean="0"/>
               <a:t>)</a:t>
             </a:r>
-            <a:endParaRPr lang="en-US" altLang="ko-KR" sz="2400" dirty="0" smtClean="0"/>
           </a:p>
           <a:p>
             <a:r>
@@ -5704,7 +5683,6 @@
               <a:rPr lang="en-US" altLang="ko-KR" sz="2400" dirty="0" smtClean="0"/>
               <a:t>Gazebo)</a:t>
             </a:r>
-            <a:endParaRPr lang="en-US" altLang="ko-KR" sz="2400" dirty="0" smtClean="0"/>
           </a:p>
           <a:p>
             <a:r>
@@ -5717,17 +5695,28 @@
             </a:r>
             <a:r>
               <a:rPr lang="en-US" altLang="ko-KR" sz="2400" dirty="0" smtClean="0"/>
-              <a:t>6 (ROS</a:t>
-            </a:r>
-            <a:r>
-              <a:rPr lang="ko-KR" altLang="en-US" sz="2400" dirty="0" smtClean="0"/>
-              <a:t>↔미정</a:t>
+              <a:t>6 (</a:t>
+            </a:r>
+            <a:r>
+              <a:rPr lang="en-US" altLang="ko-KR" sz="2400" b="1" dirty="0" smtClean="0"/>
+              <a:t>ROS</a:t>
+            </a:r>
+            <a:r>
+              <a:rPr lang="ko-KR" altLang="en-US" sz="2400" b="1" dirty="0" smtClean="0"/>
+              <a:t>↔</a:t>
+            </a:r>
+            <a:r>
+              <a:rPr lang="en-US" altLang="ko-KR" sz="2400" dirty="0" smtClean="0"/>
+              <a:t>*</a:t>
+            </a:r>
+            <a:r>
+              <a:rPr lang="en-US" altLang="ko-KR" sz="2400" b="1" dirty="0" smtClean="0"/>
+              <a:t>TurtleBot3</a:t>
             </a:r>
             <a:r>
               <a:rPr lang="en-US" altLang="ko-KR" sz="2400" dirty="0" smtClean="0"/>
               <a:t>)</a:t>
             </a:r>
-            <a:endParaRPr lang="en-US" altLang="ko-KR" sz="2400" dirty="0" smtClean="0"/>
           </a:p>
           <a:p>
             <a:r>
@@ -5740,19 +5729,7 @@
             </a:r>
             <a:r>
               <a:rPr lang="en-US" altLang="ko-KR" sz="2400" dirty="0" smtClean="0"/>
-              <a:t>7</a:t>
-            </a:r>
-            <a:r>
-              <a:rPr lang="en-US" altLang="ko-KR" sz="2400" dirty="0" smtClean="0"/>
-              <a:t> </a:t>
-            </a:r>
-            <a:r>
-              <a:rPr lang="en-US" altLang="ko-KR" sz="2400" dirty="0" smtClean="0"/>
-              <a:t>(</a:t>
-            </a:r>
-            <a:r>
-              <a:rPr lang="en-US" altLang="ko-KR" sz="2400" dirty="0" smtClean="0"/>
-              <a:t>ROS</a:t>
+              <a:t>7 (ROS</a:t>
             </a:r>
             <a:r>
               <a:rPr lang="ko-KR" altLang="en-US" sz="2400" dirty="0" smtClean="0"/>
@@ -5760,11 +5737,7 @@
             </a:r>
             <a:r>
               <a:rPr lang="en-US" altLang="ko-KR" sz="2400" dirty="0" smtClean="0"/>
-              <a:t>Java, Android</a:t>
-            </a:r>
-            <a:r>
-              <a:rPr lang="en-US" altLang="ko-KR" sz="2400" dirty="0" smtClean="0"/>
-              <a:t>)</a:t>
+              <a:t>Java, Android)</a:t>
             </a:r>
           </a:p>
           <a:p>
@@ -5805,7 +5778,7 @@
             </a:r>
             <a:r>
               <a:rPr lang="en-US" altLang="ko-KR" sz="2400" dirty="0" smtClean="0"/>
-              <a:t>– *</a:t>
+              <a:t>– **</a:t>
             </a:r>
             <a:r>
               <a:rPr lang="ko-KR" altLang="en-US" sz="2400" b="1" dirty="0" err="1" smtClean="0"/>
@@ -5848,7 +5821,7 @@
             </a:r>
             <a:r>
               <a:rPr lang="en-US" altLang="ko-KR" sz="2400" dirty="0" smtClean="0"/>
-              <a:t>– *</a:t>
+              <a:t>– **</a:t>
             </a:r>
             <a:r>
               <a:rPr lang="ko-KR" altLang="en-US" sz="2400" b="1" dirty="0" smtClean="0"/>
@@ -5886,7 +5859,7 @@
             </a:r>
             <a:r>
               <a:rPr lang="en-US" altLang="ko-KR" sz="2400" dirty="0" smtClean="0"/>
-              <a:t> – *</a:t>
+              <a:t> – **</a:t>
             </a:r>
             <a:r>
               <a:rPr lang="ko-KR" altLang="en-US" sz="2400" b="1" dirty="0" err="1" smtClean="0"/>
@@ -5928,7 +5901,7 @@
             </a:r>
             <a:r>
               <a:rPr lang="en-US" altLang="ko-KR" sz="2400" dirty="0" smtClean="0"/>
-              <a:t>– *</a:t>
+              <a:t>– **</a:t>
             </a:r>
             <a:r>
               <a:rPr lang="ko-KR" altLang="en-US" sz="2400" b="1" dirty="0" smtClean="0"/>
@@ -5960,8 +5933,8 @@
         </p:nvSpPr>
         <p:spPr>
           <a:xfrm>
-            <a:off x="4678890" y="6381328"/>
-            <a:ext cx="4392164" cy="369332"/>
+            <a:off x="5364088" y="6237312"/>
+            <a:ext cx="3527119" cy="523220"/>
           </a:xfrm>
           <a:prstGeom prst="rect">
             <a:avLst/>
@@ -5975,26 +5948,37 @@
           <a:lstStyle/>
           <a:p>
             <a:r>
-              <a:rPr lang="en-US" altLang="ko-KR" b="1" dirty="0" smtClean="0"/>
+              <a:rPr lang="en-US" altLang="ko-KR" sz="1400" b="1" dirty="0" smtClean="0"/>
               <a:t>* </a:t>
             </a:r>
             <a:r>
-              <a:rPr lang="ko-KR" altLang="en-US" b="1" dirty="0" smtClean="0"/>
+              <a:rPr lang="ko-KR" altLang="en-US" sz="1400" b="1" dirty="0" smtClean="0"/>
+              <a:t>상황에 따라 바뀔 수도 있음</a:t>
+            </a:r>
+            <a:endParaRPr lang="en-US" altLang="ko-KR" sz="1400" b="1" dirty="0" smtClean="0"/>
+          </a:p>
+          <a:p>
+            <a:r>
+              <a:rPr lang="en-US" altLang="ko-KR" sz="1400" b="1" dirty="0" smtClean="0"/>
+              <a:t>** </a:t>
+            </a:r>
+            <a:r>
+              <a:rPr lang="ko-KR" altLang="en-US" sz="1400" b="1" dirty="0" smtClean="0"/>
               <a:t>국내 대회 </a:t>
             </a:r>
             <a:r>
-              <a:rPr lang="en-US" altLang="ko-KR" b="1" dirty="0" smtClean="0"/>
+              <a:rPr lang="en-US" altLang="ko-KR" sz="1400" b="1" dirty="0" smtClean="0"/>
               <a:t>/ </a:t>
             </a:r>
             <a:r>
-              <a:rPr lang="ko-KR" altLang="en-US" b="1" dirty="0" smtClean="0"/>
+              <a:rPr lang="ko-KR" altLang="en-US" sz="1400" b="1" dirty="0" smtClean="0"/>
               <a:t>해외 대회 </a:t>
             </a:r>
             <a:r>
-              <a:rPr lang="en-US" altLang="ko-KR" b="1" dirty="0" smtClean="0"/>
+              <a:rPr lang="en-US" altLang="ko-KR" sz="1400" b="1" dirty="0" smtClean="0"/>
               <a:t>(Taiwan, Spain)</a:t>
             </a:r>
-            <a:endParaRPr lang="ko-KR" altLang="en-US" b="1" dirty="0"/>
+            <a:endParaRPr lang="ko-KR" altLang="en-US" sz="1400" b="1" dirty="0"/>
           </a:p>
         </p:txBody>
       </p:sp>

</xml_diff>